<commit_message>
last ver of paper + ppt
</commit_message>
<xml_diff>
--- a/DH-PF-HX-467 PPT.pptx
+++ b/DH-PF-HX-467 PPT.pptx
@@ -17,23 +17,25 @@
     <p:sldId id="262" r:id="rId11"/>
     <p:sldId id="263" r:id="rId12"/>
     <p:sldId id="264" r:id="rId13"/>
+    <p:sldId id="265" r:id="rId14"/>
+    <p:sldId id="266" r:id="rId15"/>
   </p:sldIdLst>
   <p:sldSz cy="5143500" cx="9144000"/>
   <p:notesSz cx="6858000" cy="9144000"/>
   <p:embeddedFontLst>
     <p:embeddedFont>
       <p:font typeface="Economica"/>
-      <p:regular r:id="rId14"/>
-      <p:bold r:id="rId15"/>
-      <p:italic r:id="rId16"/>
-      <p:boldItalic r:id="rId17"/>
+      <p:regular r:id="rId16"/>
+      <p:bold r:id="rId17"/>
+      <p:italic r:id="rId18"/>
+      <p:boldItalic r:id="rId19"/>
     </p:embeddedFont>
     <p:embeddedFont>
       <p:font typeface="Open Sans"/>
-      <p:regular r:id="rId18"/>
-      <p:bold r:id="rId19"/>
-      <p:italic r:id="rId20"/>
-      <p:boldItalic r:id="rId21"/>
+      <p:regular r:id="rId20"/>
+      <p:bold r:id="rId21"/>
+      <p:italic r:id="rId22"/>
+      <p:boldItalic r:id="rId23"/>
     </p:embeddedFont>
   </p:embeddedFontLst>
   <p:defaultTextStyle>
@@ -482,7 +484,197 @@
           </a:bodyPr>
           <a:lstStyle/>
           <a:p>
-            <a:pPr lvl="0">
+            <a:pPr indent="0" lvl="0" marL="0">
+              <a:spcBef>
+                <a:spcPts val="0"/>
+              </a:spcBef>
+              <a:buNone/>
+            </a:pPr>
+            <a:r>
+              <a:t/>
+            </a:r>
+            <a:endParaRPr/>
+          </a:p>
+        </p:txBody>
+      </p:sp>
+    </p:spTree>
+  </p:cSld>
+  <p:clrMapOvr>
+    <a:masterClrMapping/>
+  </p:clrMapOvr>
+</p:notes>
+</file>
+
+<file path=ppt/notesSlides/notesSlide10.xml><?xml version="1.0" encoding="utf-8"?>
+<p:notes xmlns:a="http://schemas.openxmlformats.org/drawingml/2006/main" xmlns:r="http://schemas.openxmlformats.org/officeDocument/2006/relationships" xmlns:mc="http://schemas.openxmlformats.org/markup-compatibility/2006" xmlns:mv="urn:schemas-microsoft-com:mac:vml" xmlns:p="http://schemas.openxmlformats.org/presentationml/2006/main" xmlns:c="http://schemas.openxmlformats.org/drawingml/2006/chart" xmlns:dgm="http://schemas.openxmlformats.org/drawingml/2006/diagram" xmlns:o="urn:schemas-microsoft-com:office:office" xmlns:v="urn:schemas-microsoft-com:vml" xmlns:pvml="urn:schemas-microsoft-com:office:powerpoint" xmlns:com="http://schemas.openxmlformats.org/drawingml/2006/compatibility" xmlns:p14="http://schemas.microsoft.com/office/powerpoint/2010/main" xmlns:p15="http://schemas.microsoft.com/office/powerpoint/2012/main" showMasterPhAnim="0" showMasterSp="0">
+  <p:cSld>
+    <p:spTree>
+      <p:nvGrpSpPr>
+        <p:cNvPr id="151" name="Shape 151"/>
+        <p:cNvGrpSpPr/>
+        <p:nvPr/>
+      </p:nvGrpSpPr>
+      <p:grpSpPr>
+        <a:xfrm>
+          <a:off x="0" y="0"/>
+          <a:ext cx="0" cy="0"/>
+          <a:chOff x="0" y="0"/>
+          <a:chExt cx="0" cy="0"/>
+        </a:xfrm>
+      </p:grpSpPr>
+      <p:sp>
+        <p:nvSpPr>
+          <p:cNvPr id="152" name="Shape 152"/>
+          <p:cNvSpPr/>
+          <p:nvPr>
+            <p:ph idx="2" type="sldImg"/>
+          </p:nvPr>
+        </p:nvSpPr>
+        <p:spPr>
+          <a:xfrm>
+            <a:off x="381300" y="685800"/>
+            <a:ext cx="6096000" cy="3429000"/>
+          </a:xfrm>
+          <a:custGeom>
+            <a:pathLst>
+              <a:path extrusionOk="0" h="120000" w="120000">
+                <a:moveTo>
+                  <a:pt x="0" y="0"/>
+                </a:moveTo>
+                <a:lnTo>
+                  <a:pt x="120000" y="0"/>
+                </a:lnTo>
+                <a:lnTo>
+                  <a:pt x="120000" y="120000"/>
+                </a:lnTo>
+                <a:lnTo>
+                  <a:pt x="0" y="120000"/>
+                </a:lnTo>
+                <a:close/>
+              </a:path>
+            </a:pathLst>
+          </a:custGeom>
+        </p:spPr>
+      </p:sp>
+      <p:sp>
+        <p:nvSpPr>
+          <p:cNvPr id="153" name="Shape 153"/>
+          <p:cNvSpPr txBox="1"/>
+          <p:nvPr>
+            <p:ph idx="1" type="body"/>
+          </p:nvPr>
+        </p:nvSpPr>
+        <p:spPr>
+          <a:xfrm>
+            <a:off x="685800" y="4343400"/>
+            <a:ext cx="5486400" cy="4114800"/>
+          </a:xfrm>
+          <a:prstGeom prst="rect">
+            <a:avLst/>
+          </a:prstGeom>
+        </p:spPr>
+        <p:txBody>
+          <a:bodyPr anchorCtr="0" anchor="t" bIns="91425" lIns="91425" rIns="91425" wrap="square" tIns="91425">
+            <a:noAutofit/>
+          </a:bodyPr>
+          <a:lstStyle/>
+          <a:p>
+            <a:pPr indent="0" lvl="0" marL="0" rtl="0">
+              <a:spcBef>
+                <a:spcPts val="0"/>
+              </a:spcBef>
+              <a:buNone/>
+            </a:pPr>
+            <a:r>
+              <a:t/>
+            </a:r>
+            <a:endParaRPr/>
+          </a:p>
+        </p:txBody>
+      </p:sp>
+    </p:spTree>
+  </p:cSld>
+  <p:clrMapOvr>
+    <a:masterClrMapping/>
+  </p:clrMapOvr>
+</p:notes>
+</file>
+
+<file path=ppt/notesSlides/notesSlide11.xml><?xml version="1.0" encoding="utf-8"?>
+<p:notes xmlns:a="http://schemas.openxmlformats.org/drawingml/2006/main" xmlns:r="http://schemas.openxmlformats.org/officeDocument/2006/relationships" xmlns:mc="http://schemas.openxmlformats.org/markup-compatibility/2006" xmlns:mv="urn:schemas-microsoft-com:mac:vml" xmlns:p="http://schemas.openxmlformats.org/presentationml/2006/main" xmlns:c="http://schemas.openxmlformats.org/drawingml/2006/chart" xmlns:dgm="http://schemas.openxmlformats.org/drawingml/2006/diagram" xmlns:o="urn:schemas-microsoft-com:office:office" xmlns:v="urn:schemas-microsoft-com:vml" xmlns:pvml="urn:schemas-microsoft-com:office:powerpoint" xmlns:com="http://schemas.openxmlformats.org/drawingml/2006/compatibility" xmlns:p14="http://schemas.microsoft.com/office/powerpoint/2010/main" xmlns:p15="http://schemas.microsoft.com/office/powerpoint/2012/main" showMasterPhAnim="0" showMasterSp="0">
+  <p:cSld>
+    <p:spTree>
+      <p:nvGrpSpPr>
+        <p:cNvPr id="156" name="Shape 156"/>
+        <p:cNvGrpSpPr/>
+        <p:nvPr/>
+      </p:nvGrpSpPr>
+      <p:grpSpPr>
+        <a:xfrm>
+          <a:off x="0" y="0"/>
+          <a:ext cx="0" cy="0"/>
+          <a:chOff x="0" y="0"/>
+          <a:chExt cx="0" cy="0"/>
+        </a:xfrm>
+      </p:grpSpPr>
+      <p:sp>
+        <p:nvSpPr>
+          <p:cNvPr id="157" name="Shape 157"/>
+          <p:cNvSpPr/>
+          <p:nvPr>
+            <p:ph idx="2" type="sldImg"/>
+          </p:nvPr>
+        </p:nvSpPr>
+        <p:spPr>
+          <a:xfrm>
+            <a:off x="381300" y="685800"/>
+            <a:ext cx="6096000" cy="3429000"/>
+          </a:xfrm>
+          <a:custGeom>
+            <a:pathLst>
+              <a:path extrusionOk="0" h="120000" w="120000">
+                <a:moveTo>
+                  <a:pt x="0" y="0"/>
+                </a:moveTo>
+                <a:lnTo>
+                  <a:pt x="120000" y="0"/>
+                </a:lnTo>
+                <a:lnTo>
+                  <a:pt x="120000" y="120000"/>
+                </a:lnTo>
+                <a:lnTo>
+                  <a:pt x="0" y="120000"/>
+                </a:lnTo>
+                <a:close/>
+              </a:path>
+            </a:pathLst>
+          </a:custGeom>
+        </p:spPr>
+      </p:sp>
+      <p:sp>
+        <p:nvSpPr>
+          <p:cNvPr id="158" name="Shape 158"/>
+          <p:cNvSpPr txBox="1"/>
+          <p:nvPr>
+            <p:ph idx="1" type="body"/>
+          </p:nvPr>
+        </p:nvSpPr>
+        <p:spPr>
+          <a:xfrm>
+            <a:off x="685800" y="4343400"/>
+            <a:ext cx="5486400" cy="4114800"/>
+          </a:xfrm>
+          <a:prstGeom prst="rect">
+            <a:avLst/>
+          </a:prstGeom>
+        </p:spPr>
+        <p:txBody>
+          <a:bodyPr anchorCtr="0" anchor="t" bIns="91425" lIns="91425" rIns="91425" wrap="square" tIns="91425">
+            <a:noAutofit/>
+          </a:bodyPr>
+          <a:lstStyle/>
+          <a:p>
+            <a:pPr indent="0" lvl="0" marL="0">
               <a:spcBef>
                 <a:spcPts val="0"/>
               </a:spcBef>
@@ -577,7 +769,7 @@
           </a:bodyPr>
           <a:lstStyle/>
           <a:p>
-            <a:pPr lvl="0" rtl="0">
+            <a:pPr indent="0" lvl="0" marL="0" rtl="0">
               <a:lnSpc>
                 <a:spcPct val="115000"/>
               </a:lnSpc>
@@ -592,7 +784,7 @@
             </a:r>
           </a:p>
           <a:p>
-            <a:pPr lvl="0">
+            <a:pPr indent="0" lvl="0" marL="0">
               <a:spcBef>
                 <a:spcPts val="0"/>
               </a:spcBef>
@@ -687,7 +879,7 @@
           </a:bodyPr>
           <a:lstStyle/>
           <a:p>
-            <a:pPr lvl="0">
+            <a:pPr indent="0" lvl="0" marL="0">
               <a:spcBef>
                 <a:spcPts val="0"/>
               </a:spcBef>
@@ -782,7 +974,7 @@
           </a:bodyPr>
           <a:lstStyle/>
           <a:p>
-            <a:pPr lvl="0">
+            <a:pPr indent="0" lvl="0" marL="0">
               <a:spcBef>
                 <a:spcPts val="0"/>
               </a:spcBef>
@@ -877,7 +1069,7 @@
           </a:bodyPr>
           <a:lstStyle/>
           <a:p>
-            <a:pPr lvl="0">
+            <a:pPr indent="0" lvl="0" marL="0">
               <a:spcBef>
                 <a:spcPts val="0"/>
               </a:spcBef>
@@ -972,7 +1164,7 @@
           </a:bodyPr>
           <a:lstStyle/>
           <a:p>
-            <a:pPr lvl="0">
+            <a:pPr indent="0" lvl="0" marL="0">
               <a:spcBef>
                 <a:spcPts val="0"/>
               </a:spcBef>
@@ -1067,7 +1259,7 @@
           </a:bodyPr>
           <a:lstStyle/>
           <a:p>
-            <a:pPr lvl="0">
+            <a:pPr indent="0" lvl="0" marL="0">
               <a:spcBef>
                 <a:spcPts val="0"/>
               </a:spcBef>
@@ -1093,7 +1285,7 @@
   <p:cSld>
     <p:spTree>
       <p:nvGrpSpPr>
-        <p:cNvPr id="139" name="Shape 139"/>
+        <p:cNvPr id="141" name="Shape 141"/>
         <p:cNvGrpSpPr/>
         <p:nvPr/>
       </p:nvGrpSpPr>
@@ -1107,7 +1299,7 @@
       </p:grpSpPr>
       <p:sp>
         <p:nvSpPr>
-          <p:cNvPr id="140" name="Shape 140"/>
+          <p:cNvPr id="142" name="Shape 142"/>
           <p:cNvSpPr/>
           <p:nvPr>
             <p:ph idx="2" type="sldImg"/>
@@ -1141,7 +1333,7 @@
       </p:sp>
       <p:sp>
         <p:nvSpPr>
-          <p:cNvPr id="141" name="Shape 141"/>
+          <p:cNvPr id="143" name="Shape 143"/>
           <p:cNvSpPr txBox="1"/>
           <p:nvPr>
             <p:ph idx="1" type="body"/>
@@ -1162,7 +1354,7 @@
           </a:bodyPr>
           <a:lstStyle/>
           <a:p>
-            <a:pPr lvl="0" rtl="0">
+            <a:pPr indent="0" lvl="0" marL="0">
               <a:spcBef>
                 <a:spcPts val="0"/>
               </a:spcBef>
@@ -1188,7 +1380,7 @@
   <p:cSld>
     <p:spTree>
       <p:nvGrpSpPr>
-        <p:cNvPr id="144" name="Shape 144"/>
+        <p:cNvPr id="146" name="Shape 146"/>
         <p:cNvGrpSpPr/>
         <p:nvPr/>
       </p:nvGrpSpPr>
@@ -1202,7 +1394,7 @@
       </p:grpSpPr>
       <p:sp>
         <p:nvSpPr>
-          <p:cNvPr id="145" name="Shape 145"/>
+          <p:cNvPr id="147" name="Shape 147"/>
           <p:cNvSpPr/>
           <p:nvPr>
             <p:ph idx="2" type="sldImg"/>
@@ -1236,7 +1428,7 @@
       </p:sp>
       <p:sp>
         <p:nvSpPr>
-          <p:cNvPr id="146" name="Shape 146"/>
+          <p:cNvPr id="148" name="Shape 148"/>
           <p:cNvSpPr txBox="1"/>
           <p:nvPr>
             <p:ph idx="1" type="body"/>
@@ -1257,7 +1449,7 @@
           </a:bodyPr>
           <a:lstStyle/>
           <a:p>
-            <a:pPr lvl="0" rtl="0">
+            <a:pPr indent="0" lvl="0" marL="0" rtl="0">
               <a:spcBef>
                 <a:spcPts val="0"/>
               </a:spcBef>
@@ -1694,7 +1886,7 @@
           </a:bodyPr>
           <a:lstStyle/>
           <a:p>
-            <a:pPr lvl="0">
+            <a:pPr indent="0" lvl="0" marL="0">
               <a:spcBef>
                 <a:spcPts val="0"/>
               </a:spcBef>
@@ -1759,7 +1951,7 @@
           </a:bodyPr>
           <a:lstStyle/>
           <a:p>
-            <a:pPr lvl="0">
+            <a:pPr indent="0" lvl="0" marL="0">
               <a:spcBef>
                 <a:spcPts val="0"/>
               </a:spcBef>
@@ -2050,7 +2242,7 @@
           </a:bodyPr>
           <a:lstStyle/>
           <a:p>
-            <a:pPr lvl="0">
+            <a:pPr indent="0" lvl="0" marL="0">
               <a:spcBef>
                 <a:spcPts val="0"/>
               </a:spcBef>
@@ -2111,7 +2303,7 @@
           </a:bodyPr>
           <a:lstStyle/>
           <a:p>
-            <a:pPr lvl="0">
+            <a:pPr indent="0" lvl="0" marL="0">
               <a:spcBef>
                 <a:spcPts val="0"/>
               </a:spcBef>
@@ -2344,7 +2536,7 @@
           </a:bodyPr>
           <a:lstStyle/>
           <a:p>
-            <a:pPr lvl="0">
+            <a:pPr indent="0" lvl="0" marL="0">
               <a:spcBef>
                 <a:spcPts val="0"/>
               </a:spcBef>
@@ -2409,7 +2601,7 @@
           </a:bodyPr>
           <a:lstStyle/>
           <a:p>
-            <a:pPr lvl="0">
+            <a:pPr indent="0" lvl="0" marL="0">
               <a:spcBef>
                 <a:spcPts val="0"/>
               </a:spcBef>
@@ -2637,7 +2829,7 @@
           </a:bodyPr>
           <a:lstStyle/>
           <a:p>
-            <a:pPr lvl="0">
+            <a:pPr indent="0" lvl="0" marL="0">
               <a:spcBef>
                 <a:spcPts val="0"/>
               </a:spcBef>
@@ -2986,7 +3178,7 @@
           </a:bodyPr>
           <a:lstStyle/>
           <a:p>
-            <a:pPr lvl="0">
+            <a:pPr indent="0" lvl="0" marL="0">
               <a:spcBef>
                 <a:spcPts val="0"/>
               </a:spcBef>
@@ -3143,7 +3335,7 @@
           </a:bodyPr>
           <a:lstStyle/>
           <a:p>
-            <a:pPr lvl="0">
+            <a:pPr indent="0" lvl="0" marL="0">
               <a:spcBef>
                 <a:spcPts val="0"/>
               </a:spcBef>
@@ -3396,7 +3588,7 @@
           </a:bodyPr>
           <a:lstStyle/>
           <a:p>
-            <a:pPr lvl="0">
+            <a:pPr indent="0" lvl="0" marL="0">
               <a:spcBef>
                 <a:spcPts val="0"/>
               </a:spcBef>
@@ -3461,7 +3653,7 @@
           </a:bodyPr>
           <a:lstStyle/>
           <a:p>
-            <a:pPr lvl="0">
+            <a:pPr indent="0" lvl="0" marL="0">
               <a:spcBef>
                 <a:spcPts val="0"/>
               </a:spcBef>
@@ -3593,7 +3785,7 @@
           </a:bodyPr>
           <a:lstStyle/>
           <a:p>
-            <a:pPr lvl="0">
+            <a:pPr indent="0" lvl="0" marL="0">
               <a:spcBef>
                 <a:spcPts val="0"/>
               </a:spcBef>
@@ -3658,7 +3850,7 @@
           </a:bodyPr>
           <a:lstStyle/>
           <a:p>
-            <a:pPr lvl="0">
+            <a:pPr indent="0" lvl="0" marL="0">
               <a:spcBef>
                 <a:spcPts val="0"/>
               </a:spcBef>
@@ -4242,7 +4434,7 @@
           </a:bodyPr>
           <a:lstStyle/>
           <a:p>
-            <a:pPr lvl="0">
+            <a:pPr indent="0" lvl="0" marL="0">
               <a:spcBef>
                 <a:spcPts val="0"/>
               </a:spcBef>
@@ -4351,7 +4543,7 @@
           </a:bodyPr>
           <a:lstStyle/>
           <a:p>
-            <a:pPr lvl="0">
+            <a:pPr indent="0" lvl="0" marL="0">
               <a:spcBef>
                 <a:spcPts val="0"/>
               </a:spcBef>
@@ -4893,7 +5085,7 @@
           </a:bodyPr>
           <a:lstStyle/>
           <a:p>
-            <a:pPr lvl="0" algn="r">
+            <a:pPr indent="0" lvl="0" marL="0" algn="r">
               <a:spcBef>
                 <a:spcPts val="0"/>
               </a:spcBef>
@@ -5414,7 +5606,7 @@
           </a:bodyPr>
           <a:lstStyle/>
           <a:p>
-            <a:pPr lvl="0">
+            <a:pPr indent="0" lvl="0" marL="0">
               <a:spcBef>
                 <a:spcPts val="0"/>
               </a:spcBef>
@@ -5450,7 +5642,7 @@
           </a:bodyPr>
           <a:lstStyle/>
           <a:p>
-            <a:pPr lvl="0">
+            <a:pPr indent="0" lvl="0" marL="0">
               <a:spcBef>
                 <a:spcPts val="0"/>
               </a:spcBef>
@@ -5462,7 +5654,7 @@
             </a:r>
           </a:p>
           <a:p>
-            <a:pPr lvl="0">
+            <a:pPr indent="0" lvl="0" marL="0">
               <a:spcBef>
                 <a:spcPts val="0"/>
               </a:spcBef>
@@ -5474,7 +5666,7 @@
             </a:r>
           </a:p>
           <a:p>
-            <a:pPr lvl="0">
+            <a:pPr indent="0" lvl="0" marL="0">
               <a:spcBef>
                 <a:spcPts val="0"/>
               </a:spcBef>
@@ -5486,7 +5678,7 @@
             </a:r>
           </a:p>
           <a:p>
-            <a:pPr lvl="0" rtl="0">
+            <a:pPr indent="0" lvl="0" marL="0" rtl="0">
               <a:spcBef>
                 <a:spcPts val="0"/>
               </a:spcBef>
@@ -5495,6 +5687,124 @@
             <a:r>
               <a:rPr lang="en" sz="2400"/>
               <a:t>Hongyou Xiong</a:t>
+            </a:r>
+          </a:p>
+        </p:txBody>
+      </p:sp>
+    </p:spTree>
+  </p:cSld>
+  <p:clrMapOvr>
+    <a:masterClrMapping/>
+  </p:clrMapOvr>
+</p:sld>
+</file>
+
+<file path=ppt/slides/slide10.xml><?xml version="1.0" encoding="utf-8"?>
+<p:sld xmlns:a="http://schemas.openxmlformats.org/drawingml/2006/main" xmlns:r="http://schemas.openxmlformats.org/officeDocument/2006/relationships" xmlns:mc="http://schemas.openxmlformats.org/markup-compatibility/2006" xmlns:mv="urn:schemas-microsoft-com:mac:vml" xmlns:p="http://schemas.openxmlformats.org/presentationml/2006/main" xmlns:c="http://schemas.openxmlformats.org/drawingml/2006/chart" xmlns:dgm="http://schemas.openxmlformats.org/drawingml/2006/diagram" xmlns:o="urn:schemas-microsoft-com:office:office" xmlns:v="urn:schemas-microsoft-com:vml" xmlns:pvml="urn:schemas-microsoft-com:office:powerpoint" xmlns:com="http://schemas.openxmlformats.org/drawingml/2006/compatibility" xmlns:p14="http://schemas.microsoft.com/office/powerpoint/2010/main" xmlns:p15="http://schemas.microsoft.com/office/powerpoint/2012/main">
+  <p:cSld>
+    <p:spTree>
+      <p:nvGrpSpPr>
+        <p:cNvPr id="154" name="Shape 154"/>
+        <p:cNvGrpSpPr/>
+        <p:nvPr/>
+      </p:nvGrpSpPr>
+      <p:grpSpPr>
+        <a:xfrm>
+          <a:off x="0" y="0"/>
+          <a:ext cx="0" cy="0"/>
+          <a:chOff x="0" y="0"/>
+          <a:chExt cx="0" cy="0"/>
+        </a:xfrm>
+      </p:grpSpPr>
+      <p:pic>
+        <p:nvPicPr>
+          <p:cNvPr id="155" name="Shape 155"/>
+          <p:cNvPicPr preferRelativeResize="0"/>
+          <p:nvPr/>
+        </p:nvPicPr>
+        <p:blipFill>
+          <a:blip r:embed="rId3">
+            <a:alphaModFix/>
+          </a:blip>
+          <a:stretch>
+            <a:fillRect/>
+          </a:stretch>
+        </p:blipFill>
+        <p:spPr>
+          <a:xfrm>
+            <a:off x="871988" y="310988"/>
+            <a:ext cx="7400026" cy="4521525"/>
+          </a:xfrm>
+          <a:prstGeom prst="rect">
+            <a:avLst/>
+          </a:prstGeom>
+          <a:noFill/>
+          <a:ln>
+            <a:noFill/>
+          </a:ln>
+        </p:spPr>
+      </p:pic>
+    </p:spTree>
+  </p:cSld>
+  <p:clrMapOvr>
+    <a:masterClrMapping/>
+  </p:clrMapOvr>
+</p:sld>
+</file>
+
+<file path=ppt/slides/slide11.xml><?xml version="1.0" encoding="utf-8"?>
+<p:sld xmlns:a="http://schemas.openxmlformats.org/drawingml/2006/main" xmlns:r="http://schemas.openxmlformats.org/officeDocument/2006/relationships" xmlns:mc="http://schemas.openxmlformats.org/markup-compatibility/2006" xmlns:mv="urn:schemas-microsoft-com:mac:vml" xmlns:p="http://schemas.openxmlformats.org/presentationml/2006/main" xmlns:c="http://schemas.openxmlformats.org/drawingml/2006/chart" xmlns:dgm="http://schemas.openxmlformats.org/drawingml/2006/diagram" xmlns:o="urn:schemas-microsoft-com:office:office" xmlns:v="urn:schemas-microsoft-com:vml" xmlns:pvml="urn:schemas-microsoft-com:office:powerpoint" xmlns:com="http://schemas.openxmlformats.org/drawingml/2006/compatibility" xmlns:p14="http://schemas.microsoft.com/office/powerpoint/2010/main" xmlns:p15="http://schemas.microsoft.com/office/powerpoint/2012/main">
+  <p:cSld>
+    <p:spTree>
+      <p:nvGrpSpPr>
+        <p:cNvPr id="159" name="Shape 159"/>
+        <p:cNvGrpSpPr/>
+        <p:nvPr/>
+      </p:nvGrpSpPr>
+      <p:grpSpPr>
+        <a:xfrm>
+          <a:off x="0" y="0"/>
+          <a:ext cx="0" cy="0"/>
+          <a:chOff x="0" y="0"/>
+          <a:chExt cx="0" cy="0"/>
+        </a:xfrm>
+      </p:grpSpPr>
+      <p:sp>
+        <p:nvSpPr>
+          <p:cNvPr id="160" name="Shape 160"/>
+          <p:cNvSpPr txBox="1"/>
+          <p:nvPr>
+            <p:ph type="title"/>
+          </p:nvPr>
+        </p:nvSpPr>
+        <p:spPr>
+          <a:xfrm>
+            <a:off x="311700" y="2481625"/>
+            <a:ext cx="8520600" cy="831300"/>
+          </a:xfrm>
+          <a:prstGeom prst="rect">
+            <a:avLst/>
+          </a:prstGeom>
+        </p:spPr>
+        <p:txBody>
+          <a:bodyPr anchorCtr="0" anchor="b" bIns="91425" lIns="91425" rIns="91425" wrap="square" tIns="91425">
+            <a:noAutofit/>
+          </a:bodyPr>
+          <a:lstStyle/>
+          <a:p>
+            <a:pPr indent="0" lvl="0" marL="0">
+              <a:spcBef>
+                <a:spcPts val="0"/>
+              </a:spcBef>
+              <a:buNone/>
+            </a:pPr>
+            <a:r>
+              <a:rPr lang="en" sz="4800" u="sng"/>
+              <a:t>GitHub: </a:t>
+            </a:r>
+            <a:r>
+              <a:rPr lang="en"/>
+              <a:t>https://github.com/DH-PF-HX-COMP47-RhythmRunner/DH-PF-HX-COMP47-RhythmRunner</a:t>
             </a:r>
           </a:p>
         </p:txBody>
@@ -5603,7 +5913,7 @@
           </a:bodyPr>
           <a:lstStyle/>
           <a:p>
-            <a:pPr lvl="0">
+            <a:pPr indent="0" lvl="0" marL="0">
               <a:spcBef>
                 <a:spcPts val="0"/>
               </a:spcBef>
@@ -5807,7 +6117,7 @@
             </a:r>
           </a:p>
           <a:p>
-            <a:pPr lvl="0" rtl="0">
+            <a:pPr indent="0" lvl="0" marL="0" rtl="0">
               <a:lnSpc>
                 <a:spcPct val="150000"/>
               </a:lnSpc>
@@ -5827,7 +6137,7 @@
             </a:endParaRPr>
           </a:p>
           <a:p>
-            <a:pPr lvl="0">
+            <a:pPr indent="0" lvl="0" marL="0">
               <a:spcBef>
                 <a:spcPts val="0"/>
               </a:spcBef>
@@ -5893,7 +6203,7 @@
           </a:bodyPr>
           <a:lstStyle/>
           <a:p>
-            <a:pPr lvl="0">
+            <a:pPr indent="0" lvl="0" marL="0">
               <a:spcBef>
                 <a:spcPts val="0"/>
               </a:spcBef>
@@ -6070,7 +6380,7 @@
           </a:bodyPr>
           <a:lstStyle/>
           <a:p>
-            <a:pPr lvl="0">
+            <a:pPr indent="0" lvl="0" marL="0">
               <a:spcBef>
                 <a:spcPts val="0"/>
               </a:spcBef>
@@ -6616,7 +6926,7 @@
           </a:bodyPr>
           <a:lstStyle/>
           <a:p>
-            <a:pPr lvl="0" rtl="0">
+            <a:pPr indent="0" lvl="0" marL="0" rtl="0">
               <a:spcBef>
                 <a:spcPts val="0"/>
               </a:spcBef>
@@ -6629,9 +6939,37 @@
           </a:p>
         </p:txBody>
       </p:sp>
+      <p:pic>
+        <p:nvPicPr>
+          <p:cNvPr id="101" name="Shape 101"/>
+          <p:cNvPicPr preferRelativeResize="0"/>
+          <p:nvPr/>
+        </p:nvPicPr>
+        <p:blipFill>
+          <a:blip r:embed="rId3">
+            <a:alphaModFix amt="17000"/>
+          </a:blip>
+          <a:stretch>
+            <a:fillRect/>
+          </a:stretch>
+        </p:blipFill>
+        <p:spPr>
+          <a:xfrm>
+            <a:off x="28275" y="0"/>
+            <a:ext cx="9144000" cy="5036825"/>
+          </a:xfrm>
+          <a:prstGeom prst="rect">
+            <a:avLst/>
+          </a:prstGeom>
+          <a:noFill/>
+          <a:ln>
+            <a:noFill/>
+          </a:ln>
+        </p:spPr>
+      </p:pic>
       <p:sp>
         <p:nvSpPr>
-          <p:cNvPr id="101" name="Shape 101"/>
+          <p:cNvPr id="102" name="Shape 102"/>
           <p:cNvSpPr txBox="1"/>
           <p:nvPr>
             <p:ph idx="1" type="body"/>
@@ -6639,8 +6977,8 @@
         </p:nvSpPr>
         <p:spPr>
           <a:xfrm>
-            <a:off x="311700" y="1225225"/>
-            <a:ext cx="8520600" cy="3354000"/>
+            <a:off x="311700" y="1147225"/>
+            <a:ext cx="8520600" cy="3889500"/>
           </a:xfrm>
           <a:prstGeom prst="rect">
             <a:avLst/>
@@ -6691,7 +7029,107 @@
                 <a:cs typeface="Economica"/>
                 <a:sym typeface="Economica"/>
               </a:rPr>
-              <a:t> Transformation </a:t>
+              <a:t> Transformation</a:t>
+            </a:r>
+          </a:p>
+          <a:p>
+            <a:pPr indent="-381000" lvl="1" marL="914400" rtl="0">
+              <a:lnSpc>
+                <a:spcPct val="150000"/>
+              </a:lnSpc>
+              <a:spcBef>
+                <a:spcPts val="0"/>
+              </a:spcBef>
+              <a:spcAft>
+                <a:spcPts val="0"/>
+              </a:spcAft>
+              <a:buSzPts val="2400"/>
+              <a:buFont typeface="Economica"/>
+              <a:buChar char="○"/>
+            </a:pPr>
+            <a:r>
+              <a:rPr lang="en" sz="2400">
+                <a:latin typeface="Economica"/>
+                <a:ea typeface="Economica"/>
+                <a:cs typeface="Economica"/>
+                <a:sym typeface="Economica"/>
+              </a:rPr>
+              <a:t>On Level 3, Use FFT on next 15 ms of audio, find highest frequency</a:t>
+            </a:r>
+          </a:p>
+          <a:p>
+            <a:pPr indent="-381000" lvl="1" marL="914400" rtl="0">
+              <a:lnSpc>
+                <a:spcPct val="150000"/>
+              </a:lnSpc>
+              <a:spcBef>
+                <a:spcPts val="0"/>
+              </a:spcBef>
+              <a:spcAft>
+                <a:spcPts val="0"/>
+              </a:spcAft>
+              <a:buSzPts val="2400"/>
+              <a:buFont typeface="Economica"/>
+              <a:buChar char="○"/>
+            </a:pPr>
+            <a:r>
+              <a:rPr lang="en" sz="2400">
+                <a:latin typeface="Economica"/>
+                <a:ea typeface="Economica"/>
+                <a:cs typeface="Economica"/>
+                <a:sym typeface="Economica"/>
+              </a:rPr>
+              <a:t>If highest frequency below D3 (140ish hz), then place coin here</a:t>
+            </a:r>
+          </a:p>
+          <a:p>
+            <a:pPr indent="-381000" lvl="1" marL="914400" rtl="0">
+              <a:lnSpc>
+                <a:spcPct val="150000"/>
+              </a:lnSpc>
+              <a:spcBef>
+                <a:spcPts val="0"/>
+              </a:spcBef>
+              <a:spcAft>
+                <a:spcPts val="0"/>
+              </a:spcAft>
+              <a:buSzPts val="2400"/>
+              <a:buFont typeface="Economica"/>
+              <a:buChar char="○"/>
+            </a:pPr>
+            <a:r>
+              <a:rPr lang="en" sz="2400">
+                <a:latin typeface="Economica"/>
+                <a:ea typeface="Economica"/>
+                <a:cs typeface="Economica"/>
+                <a:sym typeface="Economica"/>
+              </a:rPr>
+              <a:t>Could not do it while game running, so placed all coins in level instead of generating</a:t>
+            </a:r>
+          </a:p>
+          <a:p>
+            <a:pPr indent="-381000" lvl="1" marL="914400" rtl="0">
+              <a:lnSpc>
+                <a:spcPct val="150000"/>
+              </a:lnSpc>
+              <a:spcBef>
+                <a:spcPts val="0"/>
+              </a:spcBef>
+              <a:spcAft>
+                <a:spcPts val="0"/>
+              </a:spcAft>
+              <a:buSzPts val="2400"/>
+              <a:buFont typeface="Economica"/>
+              <a:buChar char="○"/>
+            </a:pPr>
+            <a:r>
+              <a:rPr lang="en" sz="2400">
+                <a:latin typeface="Economica"/>
+                <a:ea typeface="Economica"/>
+                <a:cs typeface="Economica"/>
+                <a:sym typeface="Economica"/>
+              </a:rPr>
+              <a:t>Very time consuming, only did for level 3</a:t>
             </a:r>
           </a:p>
           <a:p>
@@ -6702,9 +7140,6 @@
               <a:spcBef>
                 <a:spcPts val="0"/>
               </a:spcBef>
-              <a:spcAft>
-                <a:spcPts val="0"/>
-              </a:spcAft>
               <a:buSzPts val="2400"/>
               <a:buFont typeface="Economica"/>
               <a:buChar char="●"/>
@@ -6716,76 +7151,11 @@
                 <a:cs typeface="Economica"/>
                 <a:sym typeface="Economica"/>
               </a:rPr>
-              <a:t>After Collecting 20 Coins </a:t>
+              <a:t>After Collecting 20 Coins, pitch of music increases (about .04 pitch per 20 coins)</a:t>
             </a:r>
-          </a:p>
-          <a:p>
-            <a:pPr indent="-381000" lvl="0" marL="457200" rtl="0">
-              <a:lnSpc>
-                <a:spcPct val="150000"/>
-              </a:lnSpc>
-              <a:spcBef>
-                <a:spcPts val="0"/>
-              </a:spcBef>
-              <a:buSzPts val="2400"/>
-              <a:buChar char="●"/>
-            </a:pPr>
-            <a:r>
-              <a:rPr lang="en" sz="2400">
-                <a:latin typeface="Economica"/>
-                <a:ea typeface="Economica"/>
-                <a:cs typeface="Economica"/>
-                <a:sym typeface="Economica"/>
-              </a:rPr>
-              <a:t>Pitch of Music Changes</a:t>
-            </a:r>
-            <a:r>
-              <a:rPr lang="en" sz="2400"/>
-              <a:t> </a:t>
-            </a:r>
-          </a:p>
-          <a:p>
-            <a:pPr lvl="0" rtl="0">
-              <a:spcBef>
-                <a:spcPts val="0"/>
-              </a:spcBef>
-              <a:buNone/>
-            </a:pPr>
-            <a:r>
-              <a:t/>
-            </a:r>
-            <a:endParaRPr/>
           </a:p>
         </p:txBody>
       </p:sp>
-      <p:pic>
-        <p:nvPicPr>
-          <p:cNvPr id="102" name="Shape 102"/>
-          <p:cNvPicPr preferRelativeResize="0"/>
-          <p:nvPr/>
-        </p:nvPicPr>
-        <p:blipFill>
-          <a:blip r:embed="rId3">
-            <a:alphaModFix amt="17000"/>
-          </a:blip>
-          <a:stretch>
-            <a:fillRect/>
-          </a:stretch>
-        </p:blipFill>
-        <p:spPr>
-          <a:xfrm>
-            <a:off x="0" y="0"/>
-            <a:ext cx="9144000" cy="5036825"/>
-          </a:xfrm>
-          <a:prstGeom prst="rect">
-            <a:avLst/>
-          </a:prstGeom>
-          <a:noFill/>
-          <a:ln>
-            <a:noFill/>
-          </a:ln>
-        </p:spPr>
-      </p:pic>
     </p:spTree>
   </p:cSld>
   <p:clrMapOvr>
@@ -6834,7 +7204,7 @@
           </a:bodyPr>
           <a:lstStyle/>
           <a:p>
-            <a:pPr lvl="0" algn="ctr">
+            <a:pPr indent="0" lvl="0" marL="0" algn="ctr">
               <a:spcBef>
                 <a:spcPts val="0"/>
               </a:spcBef>
@@ -6926,7 +7296,7 @@
           </a:bodyPr>
           <a:lstStyle/>
           <a:p>
-            <a:pPr lvl="0" rtl="0" algn="ctr">
+            <a:pPr indent="0" lvl="0" marL="0" rtl="0" algn="ctr">
               <a:lnSpc>
                 <a:spcPct val="115000"/>
               </a:lnSpc>
@@ -6975,7 +7345,7 @@
           </a:bodyPr>
           <a:lstStyle/>
           <a:p>
-            <a:pPr lvl="0" rtl="0" algn="ctr">
+            <a:pPr indent="0" lvl="0" marL="0" rtl="0" algn="ctr">
               <a:spcBef>
                 <a:spcPts val="0"/>
               </a:spcBef>
@@ -7021,7 +7391,7 @@
           </a:bodyPr>
           <a:lstStyle/>
           <a:p>
-            <a:pPr lvl="0" rtl="0" algn="ctr">
+            <a:pPr indent="0" lvl="0" marL="0" rtl="0" algn="ctr">
               <a:lnSpc>
                 <a:spcPct val="115000"/>
               </a:lnSpc>
@@ -7070,7 +7440,7 @@
           </a:bodyPr>
           <a:lstStyle/>
           <a:p>
-            <a:pPr lvl="0" rtl="0" algn="ctr">
+            <a:pPr indent="0" lvl="0" marL="0" rtl="0" algn="ctr">
               <a:lnSpc>
                 <a:spcPct val="115000"/>
               </a:lnSpc>
@@ -7174,7 +7544,7 @@
           </a:bodyPr>
           <a:lstStyle/>
           <a:p>
-            <a:pPr lvl="0" rtl="0" algn="ctr">
+            <a:pPr indent="0" lvl="0" marL="0" rtl="0" algn="ctr">
               <a:spcBef>
                 <a:spcPts val="0"/>
               </a:spcBef>
@@ -7220,7 +7590,7 @@
           </a:bodyPr>
           <a:lstStyle/>
           <a:p>
-            <a:pPr lvl="0" rtl="0" algn="ctr">
+            <a:pPr indent="0" lvl="0" marL="0" rtl="0" algn="ctr">
               <a:lnSpc>
                 <a:spcPct val="115000"/>
               </a:lnSpc>
@@ -7269,7 +7639,7 @@
           </a:bodyPr>
           <a:lstStyle/>
           <a:p>
-            <a:pPr lvl="0" rtl="0" algn="ctr">
+            <a:pPr indent="0" lvl="0" marL="0" rtl="0" algn="ctr">
               <a:spcBef>
                 <a:spcPts val="0"/>
               </a:spcBef>
@@ -7315,7 +7685,7 @@
           </a:bodyPr>
           <a:lstStyle/>
           <a:p>
-            <a:pPr lvl="0" rtl="0" algn="ctr">
+            <a:pPr indent="0" lvl="0" marL="0" rtl="0" algn="ctr">
               <a:spcBef>
                 <a:spcPts val="0"/>
               </a:spcBef>
@@ -7389,7 +7759,7 @@
           </a:bodyPr>
           <a:lstStyle/>
           <a:p>
-            <a:pPr lvl="0" rtl="0" algn="ctr">
+            <a:pPr indent="0" lvl="0" marL="0" rtl="0" algn="ctr">
               <a:spcBef>
                 <a:spcPts val="0"/>
               </a:spcBef>
@@ -7435,7 +7805,7 @@
           </a:bodyPr>
           <a:lstStyle/>
           <a:p>
-            <a:pPr lvl="0" rtl="0" algn="ctr">
+            <a:pPr indent="0" lvl="0" marL="0" rtl="0" algn="ctr">
               <a:lnSpc>
                 <a:spcPct val="115000"/>
               </a:lnSpc>
@@ -7507,7 +7877,7 @@
           </a:bodyPr>
           <a:lstStyle/>
           <a:p>
-            <a:pPr lvl="0">
+            <a:pPr indent="0" lvl="0" marL="0">
               <a:spcBef>
                 <a:spcPts val="0"/>
               </a:spcBef>
@@ -7810,12 +8180,56 @@
         <p:nvSpPr>
           <p:cNvPr id="138" name="Shape 138"/>
           <p:cNvSpPr txBox="1"/>
+          <p:nvPr>
+            <p:ph type="title"/>
+          </p:nvPr>
+        </p:nvSpPr>
+        <p:spPr>
+          <a:xfrm>
+            <a:off x="311700" y="315925"/>
+            <a:ext cx="8520600" cy="831300"/>
+          </a:xfrm>
+          <a:prstGeom prst="rect">
+            <a:avLst/>
+          </a:prstGeom>
+        </p:spPr>
+        <p:txBody>
+          <a:bodyPr anchorCtr="0" anchor="b" bIns="91425" lIns="91425" rIns="91425" wrap="square" tIns="91425">
+            <a:noAutofit/>
+          </a:bodyPr>
+          <a:lstStyle/>
+          <a:p>
+            <a:pPr indent="0" lvl="0" marL="0">
+              <a:spcBef>
+                <a:spcPts val="0"/>
+              </a:spcBef>
+              <a:buNone/>
+            </a:pPr>
+            <a:r>
+              <a:rPr lang="en"/>
+              <a:t>Playtesting</a:t>
+            </a:r>
+          </a:p>
+        </p:txBody>
+      </p:sp>
+      <p:pic>
+        <p:nvPicPr>
+          <p:cNvPr id="139" name="Shape 139"/>
+          <p:cNvPicPr preferRelativeResize="0"/>
           <p:nvPr/>
-        </p:nvSpPr>
-        <p:spPr>
-          <a:xfrm>
-            <a:off x="2390400" y="1605925"/>
-            <a:ext cx="4363200" cy="509100"/>
+        </p:nvPicPr>
+        <p:blipFill>
+          <a:blip r:embed="rId3">
+            <a:alphaModFix amt="25000"/>
+          </a:blip>
+          <a:stretch>
+            <a:fillRect/>
+          </a:stretch>
+        </p:blipFill>
+        <p:spPr>
+          <a:xfrm>
+            <a:off x="4182625" y="307338"/>
+            <a:ext cx="4528825" cy="4528825"/>
           </a:xfrm>
           <a:prstGeom prst="rect">
             <a:avLst/>
@@ -7824,6 +8238,32 @@
           <a:ln>
             <a:noFill/>
           </a:ln>
+          <a:effectLst>
+            <a:outerShdw blurRad="57150" rotWithShape="0" algn="bl" dir="5400000" dist="19050">
+              <a:srgbClr val="000000">
+                <a:alpha val="50000"/>
+              </a:srgbClr>
+            </a:outerShdw>
+            <a:reflection blurRad="0" dir="5400000" dist="38100" endA="0" endPos="30000" fadeDir="5400012" kx="0" rotWithShape="0" algn="bl" stPos="0" sy="-100000" ky="0"/>
+          </a:effectLst>
+        </p:spPr>
+      </p:pic>
+      <p:sp>
+        <p:nvSpPr>
+          <p:cNvPr id="140" name="Shape 140"/>
+          <p:cNvSpPr txBox="1"/>
+          <p:nvPr>
+            <p:ph idx="1" type="body"/>
+          </p:nvPr>
+        </p:nvSpPr>
+        <p:spPr>
+          <a:xfrm>
+            <a:off x="311700" y="1225225"/>
+            <a:ext cx="8520600" cy="3354000"/>
+          </a:xfrm>
+          <a:prstGeom prst="rect">
+            <a:avLst/>
+          </a:prstGeom>
         </p:spPr>
         <p:txBody>
           <a:bodyPr anchorCtr="0" anchor="t" bIns="91425" lIns="91425" rIns="91425" wrap="square" tIns="91425">
@@ -7831,7 +8271,130 @@
           </a:bodyPr>
           <a:lstStyle/>
           <a:p>
-            <a:pPr lvl="0">
+            <a:pPr indent="-381000" lvl="0" marL="457200" rtl="0">
+              <a:lnSpc>
+                <a:spcPct val="150000"/>
+              </a:lnSpc>
+              <a:spcBef>
+                <a:spcPts val="0"/>
+              </a:spcBef>
+              <a:spcAft>
+                <a:spcPts val="0"/>
+              </a:spcAft>
+              <a:buSzPts val="2400"/>
+              <a:buFont typeface="Economica"/>
+              <a:buChar char="●"/>
+            </a:pPr>
+            <a:r>
+              <a:rPr lang="en" sz="2400">
+                <a:latin typeface="Economica"/>
+                <a:ea typeface="Economica"/>
+                <a:cs typeface="Economica"/>
+                <a:sym typeface="Economica"/>
+              </a:rPr>
+              <a:t>Playtested our own game internally and with couple additional users</a:t>
+            </a:r>
+          </a:p>
+          <a:p>
+            <a:pPr indent="-381000" lvl="0" marL="457200" rtl="0">
+              <a:lnSpc>
+                <a:spcPct val="150000"/>
+              </a:lnSpc>
+              <a:spcBef>
+                <a:spcPts val="0"/>
+              </a:spcBef>
+              <a:spcAft>
+                <a:spcPts val="0"/>
+              </a:spcAft>
+              <a:buSzPts val="2400"/>
+              <a:buFont typeface="Economica"/>
+              <a:buChar char="●"/>
+            </a:pPr>
+            <a:r>
+              <a:rPr lang="en" sz="2400">
+                <a:latin typeface="Economica"/>
+                <a:ea typeface="Economica"/>
+                <a:cs typeface="Economica"/>
+                <a:sym typeface="Economica"/>
+              </a:rPr>
+              <a:t>Tested various versions of traps, coins, enemies</a:t>
+            </a:r>
+          </a:p>
+          <a:p>
+            <a:pPr indent="-381000" lvl="0" marL="457200" rtl="0">
+              <a:lnSpc>
+                <a:spcPct val="150000"/>
+              </a:lnSpc>
+              <a:spcBef>
+                <a:spcPts val="0"/>
+              </a:spcBef>
+              <a:buSzPts val="2400"/>
+              <a:buFont typeface="Economica"/>
+              <a:buChar char="●"/>
+            </a:pPr>
+            <a:r>
+              <a:rPr lang="en" sz="2400">
+                <a:latin typeface="Economica"/>
+                <a:ea typeface="Economica"/>
+                <a:cs typeface="Economica"/>
+                <a:sym typeface="Economica"/>
+              </a:rPr>
+              <a:t>Tested audio code by using Visual Studio Debugger and stepping through while game was running</a:t>
+            </a:r>
+          </a:p>
+        </p:txBody>
+      </p:sp>
+    </p:spTree>
+  </p:cSld>
+  <p:clrMapOvr>
+    <a:masterClrMapping/>
+  </p:clrMapOvr>
+</p:sld>
+</file>
+
+<file path=ppt/slides/slide8.xml><?xml version="1.0" encoding="utf-8"?>
+<p:sld xmlns:a="http://schemas.openxmlformats.org/drawingml/2006/main" xmlns:r="http://schemas.openxmlformats.org/officeDocument/2006/relationships" xmlns:mc="http://schemas.openxmlformats.org/markup-compatibility/2006" xmlns:mv="urn:schemas-microsoft-com:mac:vml" xmlns:p="http://schemas.openxmlformats.org/presentationml/2006/main" xmlns:c="http://schemas.openxmlformats.org/drawingml/2006/chart" xmlns:dgm="http://schemas.openxmlformats.org/drawingml/2006/diagram" xmlns:o="urn:schemas-microsoft-com:office:office" xmlns:v="urn:schemas-microsoft-com:vml" xmlns:pvml="urn:schemas-microsoft-com:office:powerpoint" xmlns:com="http://schemas.openxmlformats.org/drawingml/2006/compatibility" xmlns:p14="http://schemas.microsoft.com/office/powerpoint/2010/main" xmlns:p15="http://schemas.microsoft.com/office/powerpoint/2012/main">
+  <p:cSld>
+    <p:spTree>
+      <p:nvGrpSpPr>
+        <p:cNvPr id="144" name="Shape 144"/>
+        <p:cNvGrpSpPr/>
+        <p:nvPr/>
+      </p:nvGrpSpPr>
+      <p:grpSpPr>
+        <a:xfrm>
+          <a:off x="0" y="0"/>
+          <a:ext cx="0" cy="0"/>
+          <a:chOff x="0" y="0"/>
+          <a:chExt cx="0" cy="0"/>
+        </a:xfrm>
+      </p:grpSpPr>
+      <p:sp>
+        <p:nvSpPr>
+          <p:cNvPr id="145" name="Shape 145"/>
+          <p:cNvSpPr txBox="1"/>
+          <p:nvPr/>
+        </p:nvSpPr>
+        <p:spPr>
+          <a:xfrm>
+            <a:off x="2390400" y="1605925"/>
+            <a:ext cx="4363200" cy="509100"/>
+          </a:xfrm>
+          <a:prstGeom prst="rect">
+            <a:avLst/>
+          </a:prstGeom>
+          <a:noFill/>
+          <a:ln>
+            <a:noFill/>
+          </a:ln>
+        </p:spPr>
+        <p:txBody>
+          <a:bodyPr anchorCtr="0" anchor="t" bIns="91425" lIns="91425" rIns="91425" wrap="square" tIns="91425">
+            <a:noAutofit/>
+          </a:bodyPr>
+          <a:lstStyle/>
+          <a:p>
+            <a:pPr indent="0" lvl="0" marL="0">
               <a:spcBef>
                 <a:spcPts val="0"/>
               </a:spcBef>
@@ -7857,12 +8420,12 @@
 </p:sld>
 </file>
 
-<file path=ppt/slides/slide8.xml><?xml version="1.0" encoding="utf-8"?>
+<file path=ppt/slides/slide9.xml><?xml version="1.0" encoding="utf-8"?>
 <p:sld xmlns:a="http://schemas.openxmlformats.org/drawingml/2006/main" xmlns:r="http://schemas.openxmlformats.org/officeDocument/2006/relationships" xmlns:mc="http://schemas.openxmlformats.org/markup-compatibility/2006" xmlns:mv="urn:schemas-microsoft-com:mac:vml" xmlns:p="http://schemas.openxmlformats.org/presentationml/2006/main" xmlns:c="http://schemas.openxmlformats.org/drawingml/2006/chart" xmlns:dgm="http://schemas.openxmlformats.org/drawingml/2006/diagram" xmlns:o="urn:schemas-microsoft-com:office:office" xmlns:v="urn:schemas-microsoft-com:vml" xmlns:pvml="urn:schemas-microsoft-com:office:powerpoint" xmlns:com="http://schemas.openxmlformats.org/drawingml/2006/compatibility" xmlns:p14="http://schemas.microsoft.com/office/powerpoint/2010/main" xmlns:p15="http://schemas.microsoft.com/office/powerpoint/2012/main">
   <p:cSld>
     <p:spTree>
       <p:nvGrpSpPr>
-        <p:cNvPr id="142" name="Shape 142"/>
+        <p:cNvPr id="149" name="Shape 149"/>
         <p:cNvGrpSpPr/>
         <p:nvPr/>
       </p:nvGrpSpPr>
@@ -7876,7 +8439,7 @@
       </p:grpSpPr>
       <p:pic>
         <p:nvPicPr>
-          <p:cNvPr id="143" name="Shape 143"/>
+          <p:cNvPr id="150" name="Shape 150"/>
           <p:cNvPicPr preferRelativeResize="0"/>
           <p:nvPr/>
         </p:nvPicPr>
@@ -7910,60 +8473,286 @@
 </p:sld>
 </file>
 
-<file path=ppt/slides/slide9.xml><?xml version="1.0" encoding="utf-8"?>
-<p:sld xmlns:a="http://schemas.openxmlformats.org/drawingml/2006/main" xmlns:r="http://schemas.openxmlformats.org/officeDocument/2006/relationships" xmlns:mc="http://schemas.openxmlformats.org/markup-compatibility/2006" xmlns:mv="urn:schemas-microsoft-com:mac:vml" xmlns:p="http://schemas.openxmlformats.org/presentationml/2006/main" xmlns:c="http://schemas.openxmlformats.org/drawingml/2006/chart" xmlns:dgm="http://schemas.openxmlformats.org/drawingml/2006/diagram" xmlns:o="urn:schemas-microsoft-com:office:office" xmlns:v="urn:schemas-microsoft-com:vml" xmlns:pvml="urn:schemas-microsoft-com:office:powerpoint" xmlns:com="http://schemas.openxmlformats.org/drawingml/2006/compatibility" xmlns:p14="http://schemas.microsoft.com/office/powerpoint/2010/main" xmlns:p15="http://schemas.microsoft.com/office/powerpoint/2012/main">
-  <p:cSld>
-    <p:spTree>
-      <p:nvGrpSpPr>
-        <p:cNvPr id="147" name="Shape 147"/>
-        <p:cNvGrpSpPr/>
-        <p:nvPr/>
-      </p:nvGrpSpPr>
-      <p:grpSpPr>
-        <a:xfrm>
-          <a:off x="0" y="0"/>
-          <a:ext cx="0" cy="0"/>
-          <a:chOff x="0" y="0"/>
-          <a:chExt cx="0" cy="0"/>
-        </a:xfrm>
-      </p:grpSpPr>
-      <p:pic>
-        <p:nvPicPr>
-          <p:cNvPr id="148" name="Shape 148"/>
-          <p:cNvPicPr preferRelativeResize="0"/>
-          <p:nvPr/>
-        </p:nvPicPr>
-        <p:blipFill>
-          <a:blip r:embed="rId3">
-            <a:alphaModFix/>
-          </a:blip>
-          <a:stretch>
-            <a:fillRect/>
-          </a:stretch>
-        </p:blipFill>
-        <p:spPr>
-          <a:xfrm>
-            <a:off x="871988" y="310988"/>
-            <a:ext cx="7400026" cy="4521525"/>
-          </a:xfrm>
-          <a:prstGeom prst="rect">
-            <a:avLst/>
-          </a:prstGeom>
-          <a:noFill/>
-          <a:ln>
-            <a:noFill/>
-          </a:ln>
-        </p:spPr>
-      </p:pic>
-    </p:spTree>
-  </p:cSld>
-  <p:clrMapOvr>
-    <a:masterClrMapping/>
-  </p:clrMapOvr>
-</p:sld>
+<file path=ppt/theme/theme1.xml><?xml version="1.0" encoding="utf-8"?>
+<a:theme xmlns:a="http://schemas.openxmlformats.org/drawingml/2006/main" xmlns:r="http://schemas.openxmlformats.org/officeDocument/2006/relationships" name="Luxe">
+  <a:themeElements>
+    <a:clrScheme name="Luxe">
+      <a:dk1>
+        <a:srgbClr val="000000"/>
+      </a:dk1>
+      <a:lt1>
+        <a:srgbClr val="FFFFFF"/>
+      </a:lt1>
+      <a:dk2>
+        <a:srgbClr val="B7B7B7"/>
+      </a:dk2>
+      <a:lt2>
+        <a:srgbClr val="CCA677"/>
+      </a:lt2>
+      <a:accent1>
+        <a:srgbClr val="5D4037"/>
+      </a:accent1>
+      <a:accent2>
+        <a:srgbClr val="455A64"/>
+      </a:accent2>
+      <a:accent3>
+        <a:srgbClr val="607D8B"/>
+      </a:accent3>
+      <a:accent4>
+        <a:srgbClr val="78909C"/>
+      </a:accent4>
+      <a:accent5>
+        <a:srgbClr val="57BB8A"/>
+      </a:accent5>
+      <a:accent6>
+        <a:srgbClr val="DCE755"/>
+      </a:accent6>
+      <a:hlink>
+        <a:srgbClr val="57BB8A"/>
+      </a:hlink>
+      <a:folHlink>
+        <a:srgbClr val="57BB8A"/>
+      </a:folHlink>
+    </a:clrScheme>
+    <a:fontScheme name="Office">
+      <a:majorFont>
+        <a:latin typeface="Arial"/>
+        <a:ea typeface=""/>
+        <a:cs typeface=""/>
+        <a:font script="Jpan" typeface="ＭＳ Ｐゴシック"/>
+        <a:font script="Hang" typeface="맑은 고딕"/>
+        <a:font script="Hans" typeface="宋体"/>
+        <a:font script="Hant" typeface="新細明體"/>
+        <a:font script="Arab" typeface="Times New Roman"/>
+        <a:font script="Hebr" typeface="Times New Roman"/>
+        <a:font script="Thai" typeface="Angsana New"/>
+        <a:font script="Ethi" typeface="Nyala"/>
+        <a:font script="Beng" typeface="Vrinda"/>
+        <a:font script="Gujr" typeface="Shruti"/>
+        <a:font script="Khmr" typeface="MoolBoran"/>
+        <a:font script="Knda" typeface="Tunga"/>
+        <a:font script="Guru" typeface="Raavi"/>
+        <a:font script="Cans" typeface="Euphemia"/>
+        <a:font script="Cher" typeface="Plantagenet Cherokee"/>
+        <a:font script="Yiii" typeface="Microsoft Yi Baiti"/>
+        <a:font script="Tibt" typeface="Microsoft Himalaya"/>
+        <a:font script="Thaa" typeface="MV Boli"/>
+        <a:font script="Deva" typeface="Mangal"/>
+        <a:font script="Telu" typeface="Gautami"/>
+        <a:font script="Taml" typeface="Latha"/>
+        <a:font script="Syrc" typeface="Estrangelo Edessa"/>
+        <a:font script="Orya" typeface="Kalinga"/>
+        <a:font script="Mlym" typeface="Kartika"/>
+        <a:font script="Laoo" typeface="DokChampa"/>
+        <a:font script="Sinh" typeface="Iskoola Pota"/>
+        <a:font script="Mong" typeface="Mongolian Baiti"/>
+        <a:font script="Viet" typeface="Times New Roman"/>
+        <a:font script="Uigh" typeface="Microsoft Uighur"/>
+        <a:font script="Geor" typeface="Sylfaen"/>
+      </a:majorFont>
+      <a:minorFont>
+        <a:latin typeface="Arial"/>
+        <a:ea typeface=""/>
+        <a:cs typeface=""/>
+        <a:font script="Jpan" typeface="ＭＳ Ｐゴシック"/>
+        <a:font script="Hang" typeface="맑은 고딕"/>
+        <a:font script="Hans" typeface="宋体"/>
+        <a:font script="Hant" typeface="新細明體"/>
+        <a:font script="Arab" typeface="Arial"/>
+        <a:font script="Hebr" typeface="Arial"/>
+        <a:font script="Thai" typeface="Cordia New"/>
+        <a:font script="Ethi" typeface="Nyala"/>
+        <a:font script="Beng" typeface="Vrinda"/>
+        <a:font script="Gujr" typeface="Shruti"/>
+        <a:font script="Khmr" typeface="DaunPenh"/>
+        <a:font script="Knda" typeface="Tunga"/>
+        <a:font script="Guru" typeface="Raavi"/>
+        <a:font script="Cans" typeface="Euphemia"/>
+        <a:font script="Cher" typeface="Plantagenet Cherokee"/>
+        <a:font script="Yiii" typeface="Microsoft Yi Baiti"/>
+        <a:font script="Tibt" typeface="Microsoft Himalaya"/>
+        <a:font script="Thaa" typeface="MV Boli"/>
+        <a:font script="Deva" typeface="Mangal"/>
+        <a:font script="Telu" typeface="Gautami"/>
+        <a:font script="Taml" typeface="Latha"/>
+        <a:font script="Syrc" typeface="Estrangelo Edessa"/>
+        <a:font script="Orya" typeface="Kalinga"/>
+        <a:font script="Mlym" typeface="Kartika"/>
+        <a:font script="Laoo" typeface="DokChampa"/>
+        <a:font script="Sinh" typeface="Iskoola Pota"/>
+        <a:font script="Mong" typeface="Mongolian Baiti"/>
+        <a:font script="Viet" typeface="Arial"/>
+        <a:font script="Uigh" typeface="Microsoft Uighur"/>
+        <a:font script="Geor" typeface="Sylfaen"/>
+      </a:minorFont>
+    </a:fontScheme>
+    <a:fmtScheme name="Office">
+      <a:fillStyleLst>
+        <a:solidFill>
+          <a:schemeClr val="phClr"/>
+        </a:solidFill>
+        <a:gradFill rotWithShape="1">
+          <a:gsLst>
+            <a:gs pos="0">
+              <a:schemeClr val="phClr">
+                <a:tint val="50000"/>
+                <a:satMod val="300000"/>
+              </a:schemeClr>
+            </a:gs>
+            <a:gs pos="35000">
+              <a:schemeClr val="phClr">
+                <a:tint val="37000"/>
+                <a:satMod val="300000"/>
+              </a:schemeClr>
+            </a:gs>
+            <a:gs pos="100000">
+              <a:schemeClr val="phClr">
+                <a:tint val="15000"/>
+                <a:satMod val="350000"/>
+              </a:schemeClr>
+            </a:gs>
+          </a:gsLst>
+          <a:lin ang="16200000" scaled="1"/>
+        </a:gradFill>
+        <a:gradFill rotWithShape="1">
+          <a:gsLst>
+            <a:gs pos="0">
+              <a:schemeClr val="phClr">
+                <a:tint val="100000"/>
+                <a:shade val="100000"/>
+                <a:satMod val="130000"/>
+              </a:schemeClr>
+            </a:gs>
+            <a:gs pos="100000">
+              <a:schemeClr val="phClr">
+                <a:tint val="50000"/>
+                <a:shade val="100000"/>
+                <a:satMod val="350000"/>
+              </a:schemeClr>
+            </a:gs>
+          </a:gsLst>
+          <a:lin ang="16200000" scaled="0"/>
+        </a:gradFill>
+      </a:fillStyleLst>
+      <a:lnStyleLst>
+        <a:ln w="9525" cap="flat" cmpd="sng" algn="ctr">
+          <a:solidFill>
+            <a:schemeClr val="phClr">
+              <a:shade val="95000"/>
+              <a:satMod val="105000"/>
+            </a:schemeClr>
+          </a:solidFill>
+          <a:prstDash val="solid"/>
+        </a:ln>
+        <a:ln w="25400" cap="flat" cmpd="sng" algn="ctr">
+          <a:solidFill>
+            <a:schemeClr val="phClr"/>
+          </a:solidFill>
+          <a:prstDash val="solid"/>
+        </a:ln>
+        <a:ln w="38100" cap="flat" cmpd="sng" algn="ctr">
+          <a:solidFill>
+            <a:schemeClr val="phClr"/>
+          </a:solidFill>
+          <a:prstDash val="solid"/>
+        </a:ln>
+      </a:lnStyleLst>
+      <a:effectStyleLst>
+        <a:effectStyle>
+          <a:effectLst>
+            <a:outerShdw blurRad="40000" dist="20000" dir="5400000" rotWithShape="0">
+              <a:srgbClr val="000000">
+                <a:alpha val="38000"/>
+              </a:srgbClr>
+            </a:outerShdw>
+          </a:effectLst>
+        </a:effectStyle>
+        <a:effectStyle>
+          <a:effectLst>
+            <a:outerShdw blurRad="40000" dist="23000" dir="5400000" rotWithShape="0">
+              <a:srgbClr val="000000">
+                <a:alpha val="35000"/>
+              </a:srgbClr>
+            </a:outerShdw>
+          </a:effectLst>
+        </a:effectStyle>
+        <a:effectStyle>
+          <a:effectLst>
+            <a:outerShdw blurRad="40000" dist="23000" dir="5400000" rotWithShape="0">
+              <a:srgbClr val="000000">
+                <a:alpha val="35000"/>
+              </a:srgbClr>
+            </a:outerShdw>
+          </a:effectLst>
+          <a:scene3d>
+            <a:camera prst="orthographicFront">
+              <a:rot lat="0" lon="0" rev="0"/>
+            </a:camera>
+            <a:lightRig rig="threePt" dir="t">
+              <a:rot lat="0" lon="0" rev="1200000"/>
+            </a:lightRig>
+          </a:scene3d>
+          <a:sp3d>
+            <a:bevelT w="63500" h="25400"/>
+          </a:sp3d>
+        </a:effectStyle>
+      </a:effectStyleLst>
+      <a:bgFillStyleLst>
+        <a:solidFill>
+          <a:schemeClr val="phClr"/>
+        </a:solidFill>
+        <a:gradFill rotWithShape="1">
+          <a:gsLst>
+            <a:gs pos="0">
+              <a:schemeClr val="phClr">
+                <a:tint val="40000"/>
+                <a:satMod val="350000"/>
+              </a:schemeClr>
+            </a:gs>
+            <a:gs pos="40000">
+              <a:schemeClr val="phClr">
+                <a:tint val="45000"/>
+                <a:shade val="99000"/>
+                <a:satMod val="350000"/>
+              </a:schemeClr>
+            </a:gs>
+            <a:gs pos="100000">
+              <a:schemeClr val="phClr">
+                <a:shade val="20000"/>
+                <a:satMod val="255000"/>
+              </a:schemeClr>
+            </a:gs>
+          </a:gsLst>
+          <a:path path="circle">
+            <a:fillToRect l="50000" t="-80000" r="50000" b="180000"/>
+          </a:path>
+        </a:gradFill>
+        <a:gradFill rotWithShape="1">
+          <a:gsLst>
+            <a:gs pos="0">
+              <a:schemeClr val="phClr">
+                <a:tint val="80000"/>
+                <a:satMod val="300000"/>
+              </a:schemeClr>
+            </a:gs>
+            <a:gs pos="100000">
+              <a:schemeClr val="phClr">
+                <a:shade val="30000"/>
+                <a:satMod val="200000"/>
+              </a:schemeClr>
+            </a:gs>
+          </a:gsLst>
+          <a:path path="circle">
+            <a:fillToRect l="50000" t="50000" r="50000" b="50000"/>
+          </a:path>
+        </a:gradFill>
+      </a:bgFillStyleLst>
+    </a:fmtScheme>
+  </a:themeElements>
+</a:theme>
 </file>
 
-<file path=ppt/theme/theme1.xml><?xml version="1.0" encoding="utf-8"?>
+<file path=ppt/theme/theme2.xml><?xml version="1.0" encoding="utf-8"?>
 <a:theme xmlns:a="http://schemas.openxmlformats.org/drawingml/2006/main" xmlns:r="http://schemas.openxmlformats.org/officeDocument/2006/relationships" name="Custom Theme">
   <a:themeElements>
     <a:clrScheme name="Default">
@@ -8240,283 +9029,4 @@
     </a:fmtScheme>
   </a:themeElements>
 </a:theme>
-</file>
-
-<file path=ppt/theme/theme2.xml><?xml version="1.0" encoding="utf-8"?>
-<a:theme xmlns:a="http://schemas.openxmlformats.org/drawingml/2006/main" xmlns:r="http://schemas.openxmlformats.org/officeDocument/2006/relationships" name="Luxe">
-  <a:themeElements>
-    <a:clrScheme name="Luxe">
-      <a:dk1>
-        <a:srgbClr val="000000"/>
-      </a:dk1>
-      <a:lt1>
-        <a:srgbClr val="FFFFFF"/>
-      </a:lt1>
-      <a:dk2>
-        <a:srgbClr val="B7B7B7"/>
-      </a:dk2>
-      <a:lt2>
-        <a:srgbClr val="CCA677"/>
-      </a:lt2>
-      <a:accent1>
-        <a:srgbClr val="5D4037"/>
-      </a:accent1>
-      <a:accent2>
-        <a:srgbClr val="455A64"/>
-      </a:accent2>
-      <a:accent3>
-        <a:srgbClr val="607D8B"/>
-      </a:accent3>
-      <a:accent4>
-        <a:srgbClr val="78909C"/>
-      </a:accent4>
-      <a:accent5>
-        <a:srgbClr val="57BB8A"/>
-      </a:accent5>
-      <a:accent6>
-        <a:srgbClr val="DCE755"/>
-      </a:accent6>
-      <a:hlink>
-        <a:srgbClr val="57BB8A"/>
-      </a:hlink>
-      <a:folHlink>
-        <a:srgbClr val="57BB8A"/>
-      </a:folHlink>
-    </a:clrScheme>
-    <a:fontScheme name="Office">
-      <a:majorFont>
-        <a:latin typeface="Arial"/>
-        <a:ea typeface=""/>
-        <a:cs typeface=""/>
-        <a:font script="Jpan" typeface="ＭＳ Ｐゴシック"/>
-        <a:font script="Hang" typeface="맑은 고딕"/>
-        <a:font script="Hans" typeface="宋体"/>
-        <a:font script="Hant" typeface="新細明體"/>
-        <a:font script="Arab" typeface="Times New Roman"/>
-        <a:font script="Hebr" typeface="Times New Roman"/>
-        <a:font script="Thai" typeface="Angsana New"/>
-        <a:font script="Ethi" typeface="Nyala"/>
-        <a:font script="Beng" typeface="Vrinda"/>
-        <a:font script="Gujr" typeface="Shruti"/>
-        <a:font script="Khmr" typeface="MoolBoran"/>
-        <a:font script="Knda" typeface="Tunga"/>
-        <a:font script="Guru" typeface="Raavi"/>
-        <a:font script="Cans" typeface="Euphemia"/>
-        <a:font script="Cher" typeface="Plantagenet Cherokee"/>
-        <a:font script="Yiii" typeface="Microsoft Yi Baiti"/>
-        <a:font script="Tibt" typeface="Microsoft Himalaya"/>
-        <a:font script="Thaa" typeface="MV Boli"/>
-        <a:font script="Deva" typeface="Mangal"/>
-        <a:font script="Telu" typeface="Gautami"/>
-        <a:font script="Taml" typeface="Latha"/>
-        <a:font script="Syrc" typeface="Estrangelo Edessa"/>
-        <a:font script="Orya" typeface="Kalinga"/>
-        <a:font script="Mlym" typeface="Kartika"/>
-        <a:font script="Laoo" typeface="DokChampa"/>
-        <a:font script="Sinh" typeface="Iskoola Pota"/>
-        <a:font script="Mong" typeface="Mongolian Baiti"/>
-        <a:font script="Viet" typeface="Times New Roman"/>
-        <a:font script="Uigh" typeface="Microsoft Uighur"/>
-        <a:font script="Geor" typeface="Sylfaen"/>
-      </a:majorFont>
-      <a:minorFont>
-        <a:latin typeface="Arial"/>
-        <a:ea typeface=""/>
-        <a:cs typeface=""/>
-        <a:font script="Jpan" typeface="ＭＳ Ｐゴシック"/>
-        <a:font script="Hang" typeface="맑은 고딕"/>
-        <a:font script="Hans" typeface="宋体"/>
-        <a:font script="Hant" typeface="新細明體"/>
-        <a:font script="Arab" typeface="Arial"/>
-        <a:font script="Hebr" typeface="Arial"/>
-        <a:font script="Thai" typeface="Cordia New"/>
-        <a:font script="Ethi" typeface="Nyala"/>
-        <a:font script="Beng" typeface="Vrinda"/>
-        <a:font script="Gujr" typeface="Shruti"/>
-        <a:font script="Khmr" typeface="DaunPenh"/>
-        <a:font script="Knda" typeface="Tunga"/>
-        <a:font script="Guru" typeface="Raavi"/>
-        <a:font script="Cans" typeface="Euphemia"/>
-        <a:font script="Cher" typeface="Plantagenet Cherokee"/>
-        <a:font script="Yiii" typeface="Microsoft Yi Baiti"/>
-        <a:font script="Tibt" typeface="Microsoft Himalaya"/>
-        <a:font script="Thaa" typeface="MV Boli"/>
-        <a:font script="Deva" typeface="Mangal"/>
-        <a:font script="Telu" typeface="Gautami"/>
-        <a:font script="Taml" typeface="Latha"/>
-        <a:font script="Syrc" typeface="Estrangelo Edessa"/>
-        <a:font script="Orya" typeface="Kalinga"/>
-        <a:font script="Mlym" typeface="Kartika"/>
-        <a:font script="Laoo" typeface="DokChampa"/>
-        <a:font script="Sinh" typeface="Iskoola Pota"/>
-        <a:font script="Mong" typeface="Mongolian Baiti"/>
-        <a:font script="Viet" typeface="Arial"/>
-        <a:font script="Uigh" typeface="Microsoft Uighur"/>
-        <a:font script="Geor" typeface="Sylfaen"/>
-      </a:minorFont>
-    </a:fontScheme>
-    <a:fmtScheme name="Office">
-      <a:fillStyleLst>
-        <a:solidFill>
-          <a:schemeClr val="phClr"/>
-        </a:solidFill>
-        <a:gradFill rotWithShape="1">
-          <a:gsLst>
-            <a:gs pos="0">
-              <a:schemeClr val="phClr">
-                <a:tint val="50000"/>
-                <a:satMod val="300000"/>
-              </a:schemeClr>
-            </a:gs>
-            <a:gs pos="35000">
-              <a:schemeClr val="phClr">
-                <a:tint val="37000"/>
-                <a:satMod val="300000"/>
-              </a:schemeClr>
-            </a:gs>
-            <a:gs pos="100000">
-              <a:schemeClr val="phClr">
-                <a:tint val="15000"/>
-                <a:satMod val="350000"/>
-              </a:schemeClr>
-            </a:gs>
-          </a:gsLst>
-          <a:lin ang="16200000" scaled="1"/>
-        </a:gradFill>
-        <a:gradFill rotWithShape="1">
-          <a:gsLst>
-            <a:gs pos="0">
-              <a:schemeClr val="phClr">
-                <a:tint val="100000"/>
-                <a:shade val="100000"/>
-                <a:satMod val="130000"/>
-              </a:schemeClr>
-            </a:gs>
-            <a:gs pos="100000">
-              <a:schemeClr val="phClr">
-                <a:tint val="50000"/>
-                <a:shade val="100000"/>
-                <a:satMod val="350000"/>
-              </a:schemeClr>
-            </a:gs>
-          </a:gsLst>
-          <a:lin ang="16200000" scaled="0"/>
-        </a:gradFill>
-      </a:fillStyleLst>
-      <a:lnStyleLst>
-        <a:ln w="9525" cap="flat" cmpd="sng" algn="ctr">
-          <a:solidFill>
-            <a:schemeClr val="phClr">
-              <a:shade val="95000"/>
-              <a:satMod val="105000"/>
-            </a:schemeClr>
-          </a:solidFill>
-          <a:prstDash val="solid"/>
-        </a:ln>
-        <a:ln w="25400" cap="flat" cmpd="sng" algn="ctr">
-          <a:solidFill>
-            <a:schemeClr val="phClr"/>
-          </a:solidFill>
-          <a:prstDash val="solid"/>
-        </a:ln>
-        <a:ln w="38100" cap="flat" cmpd="sng" algn="ctr">
-          <a:solidFill>
-            <a:schemeClr val="phClr"/>
-          </a:solidFill>
-          <a:prstDash val="solid"/>
-        </a:ln>
-      </a:lnStyleLst>
-      <a:effectStyleLst>
-        <a:effectStyle>
-          <a:effectLst>
-            <a:outerShdw blurRad="40000" dist="20000" dir="5400000" rotWithShape="0">
-              <a:srgbClr val="000000">
-                <a:alpha val="38000"/>
-              </a:srgbClr>
-            </a:outerShdw>
-          </a:effectLst>
-        </a:effectStyle>
-        <a:effectStyle>
-          <a:effectLst>
-            <a:outerShdw blurRad="40000" dist="23000" dir="5400000" rotWithShape="0">
-              <a:srgbClr val="000000">
-                <a:alpha val="35000"/>
-              </a:srgbClr>
-            </a:outerShdw>
-          </a:effectLst>
-        </a:effectStyle>
-        <a:effectStyle>
-          <a:effectLst>
-            <a:outerShdw blurRad="40000" dist="23000" dir="5400000" rotWithShape="0">
-              <a:srgbClr val="000000">
-                <a:alpha val="35000"/>
-              </a:srgbClr>
-            </a:outerShdw>
-          </a:effectLst>
-          <a:scene3d>
-            <a:camera prst="orthographicFront">
-              <a:rot lat="0" lon="0" rev="0"/>
-            </a:camera>
-            <a:lightRig rig="threePt" dir="t">
-              <a:rot lat="0" lon="0" rev="1200000"/>
-            </a:lightRig>
-          </a:scene3d>
-          <a:sp3d>
-            <a:bevelT w="63500" h="25400"/>
-          </a:sp3d>
-        </a:effectStyle>
-      </a:effectStyleLst>
-      <a:bgFillStyleLst>
-        <a:solidFill>
-          <a:schemeClr val="phClr"/>
-        </a:solidFill>
-        <a:gradFill rotWithShape="1">
-          <a:gsLst>
-            <a:gs pos="0">
-              <a:schemeClr val="phClr">
-                <a:tint val="40000"/>
-                <a:satMod val="350000"/>
-              </a:schemeClr>
-            </a:gs>
-            <a:gs pos="40000">
-              <a:schemeClr val="phClr">
-                <a:tint val="45000"/>
-                <a:shade val="99000"/>
-                <a:satMod val="350000"/>
-              </a:schemeClr>
-            </a:gs>
-            <a:gs pos="100000">
-              <a:schemeClr val="phClr">
-                <a:shade val="20000"/>
-                <a:satMod val="255000"/>
-              </a:schemeClr>
-            </a:gs>
-          </a:gsLst>
-          <a:path path="circle">
-            <a:fillToRect l="50000" t="-80000" r="50000" b="180000"/>
-          </a:path>
-        </a:gradFill>
-        <a:gradFill rotWithShape="1">
-          <a:gsLst>
-            <a:gs pos="0">
-              <a:schemeClr val="phClr">
-                <a:tint val="80000"/>
-                <a:satMod val="300000"/>
-              </a:schemeClr>
-            </a:gs>
-            <a:gs pos="100000">
-              <a:schemeClr val="phClr">
-                <a:shade val="30000"/>
-                <a:satMod val="200000"/>
-              </a:schemeClr>
-            </a:gs>
-          </a:gsLst>
-          <a:path path="circle">
-            <a:fillToRect l="50000" t="50000" r="50000" b="50000"/>
-          </a:path>
-        </a:gradFill>
-      </a:bgFillStyleLst>
-    </a:fmtScheme>
-  </a:themeElements>
-</a:theme>
 </file>
</xml_diff>